<commit_message>
Apply suggestions based on review feedbacks
</commit_message>
<xml_diff>
--- a/docs/media/cheat-sheet-hedging.pptx
+++ b/docs/media/cheat-sheet-hedging.pptx
@@ -2124,7 +2124,7 @@
           </a:ln>
           <a:extLst>
             <a:ext uri="{C572A759-6A51-4108-AA02-DFA0A04FC94B}">
-              <ma14:wrappingTextBoxFlag xmlns="" xmlns:m="http://schemas.openxmlformats.org/officeDocument/2006/math" xmlns:a14="http://schemas.microsoft.com/office/drawing/2010/main" xmlns:ma14="http://schemas.microsoft.com/office/mac/drawingml/2011/main" val="1"/>
+              <ma14:wrappingTextBoxFlag xmlns:ma14="http://schemas.microsoft.com/office/mac/drawingml/2011/main" xmlns:a14="http://schemas.microsoft.com/office/drawing/2010/main" xmlns:m="http://schemas.openxmlformats.org/officeDocument/2006/math" xmlns="" val="1"/>
             </a:ext>
           </a:extLst>
         </p:spPr>
@@ -2163,7 +2163,7 @@
           </a:ln>
           <a:extLst>
             <a:ext uri="{C572A759-6A51-4108-AA02-DFA0A04FC94B}">
-              <ma14:wrappingTextBoxFlag xmlns="" xmlns:m="http://schemas.openxmlformats.org/officeDocument/2006/math" xmlns:a14="http://schemas.microsoft.com/office/drawing/2010/main" xmlns:ma14="http://schemas.microsoft.com/office/mac/drawingml/2011/main" val="1"/>
+              <ma14:wrappingTextBoxFlag xmlns:ma14="http://schemas.microsoft.com/office/mac/drawingml/2011/main" xmlns:a14="http://schemas.microsoft.com/office/drawing/2010/main" xmlns:m="http://schemas.openxmlformats.org/officeDocument/2006/math" xmlns="" val="1"/>
             </a:ext>
           </a:extLst>
         </p:spPr>
@@ -3187,7 +3187,7 @@
                 <a:latin typeface="Source Sans Pro" panose="020B0503030403020204" pitchFamily="34" charset="0"/>
                 <a:ea typeface="Source Sans Pro" panose="020B0503030403020204" pitchFamily="34" charset="0"/>
               </a:rPr>
-              <a:t>allows you to execute more than one invocations </a:t>
+              <a:t>allows you to execute more than one invocation </a:t>
             </a:r>
             <a:r>
               <a:rPr lang="en-GB" sz="1600" b="0" dirty="0">
@@ -3195,7 +3195,7 @@
                 <a:latin typeface="Source Sans Pro" panose="020B0503030403020204" pitchFamily="34" charset="0"/>
                 <a:ea typeface="Source Sans Pro" panose="020B0503030403020204" pitchFamily="34" charset="0"/>
               </a:rPr>
-              <a:t>if the original is failed or considered too slow.</a:t>
+              <a:t>if the original has failed or considered too slow.</a:t>
             </a:r>
           </a:p>
           <a:p>
@@ -3320,7 +3320,7 @@
                 <a:latin typeface="Source Sans Pro" panose="020B0503030403020204" pitchFamily="34" charset="0"/>
                 <a:ea typeface="Source Sans Pro" panose="020B0503030403020204" pitchFamily="34" charset="0"/>
               </a:rPr>
-              <a:t>Delay greater than 0 second </a:t>
+              <a:t>Delay greater than 0 seconds </a:t>
             </a:r>
             <a:r>
               <a:rPr lang="en-GB" sz="1600" b="0" dirty="0">
@@ -3341,7 +3341,7 @@
                 <a:latin typeface="Source Sans Pro" panose="020B0503030403020204" pitchFamily="34" charset="0"/>
                 <a:ea typeface="Source Sans Pro" panose="020B0503030403020204" pitchFamily="34" charset="0"/>
               </a:rPr>
-              <a:t> and issue a new one only if the previous is taking too long.</a:t>
+              <a:t> and issue a new one only if the previous one is taking too long.</a:t>
             </a:r>
           </a:p>
           <a:p>
@@ -3384,7 +3384,7 @@
                 <a:latin typeface="Source Sans Pro" panose="020B0503030403020204" pitchFamily="34" charset="0"/>
                 <a:ea typeface="Source Sans Pro" panose="020B0503030403020204" pitchFamily="34" charset="0"/>
               </a:rPr>
-              <a:t> and issue a new one only if the previous failed.</a:t>
+              <a:t> and issue a new one only if the previous one failed.</a:t>
             </a:r>
           </a:p>
           <a:p>
@@ -3406,7 +3406,7 @@
                 <a:latin typeface="Source Sans Pro" panose="020B0503030403020204" pitchFamily="34" charset="0"/>
                 <a:ea typeface="Source Sans Pro" panose="020B0503030403020204" pitchFamily="34" charset="0"/>
               </a:rPr>
-              <a:t>Delay to 0 second </a:t>
+              <a:t>Delay to 0 seconds </a:t>
             </a:r>
             <a:r>
               <a:rPr lang="en-GB" sz="1600" b="0" dirty="0">
@@ -3427,7 +3427,7 @@
                 <a:latin typeface="Source Sans Pro" panose="020B0503030403020204" pitchFamily="34" charset="0"/>
                 <a:ea typeface="Source Sans Pro" panose="020B0503030403020204" pitchFamily="34" charset="0"/>
               </a:rPr>
-              <a:t> and wait only for the fastest to complete.</a:t>
+              <a:t> and wait only for the fastest one to complete.</a:t>
             </a:r>
           </a:p>
         </p:txBody>
@@ -3451,7 +3451,7 @@
           </a:ln>
           <a:extLst>
             <a:ext uri="{C572A759-6A51-4108-AA02-DFA0A04FC94B}">
-              <ma14:wrappingTextBoxFlag xmlns="" xmlns:m="http://schemas.openxmlformats.org/officeDocument/2006/math" xmlns:a14="http://schemas.microsoft.com/office/drawing/2010/main" xmlns:ma14="http://schemas.microsoft.com/office/mac/drawingml/2011/main" val="1"/>
+              <ma14:wrappingTextBoxFlag xmlns:ma14="http://schemas.microsoft.com/office/mac/drawingml/2011/main" xmlns:a14="http://schemas.microsoft.com/office/drawing/2010/main" xmlns:m="http://schemas.openxmlformats.org/officeDocument/2006/math" xmlns="" val="1"/>
             </a:ext>
           </a:extLst>
         </p:spPr>
@@ -3552,7 +3552,7 @@
           </a:ln>
           <a:extLst>
             <a:ext uri="{C572A759-6A51-4108-AA02-DFA0A04FC94B}">
-              <ma14:wrappingTextBoxFlag xmlns="" xmlns:m="http://schemas.openxmlformats.org/officeDocument/2006/math" xmlns:a14="http://schemas.microsoft.com/office/drawing/2010/main" xmlns:ma14="http://schemas.microsoft.com/office/mac/drawingml/2011/main" val="1"/>
+              <ma14:wrappingTextBoxFlag xmlns:ma14="http://schemas.microsoft.com/office/mac/drawingml/2011/main" xmlns:a14="http://schemas.microsoft.com/office/drawing/2010/main" xmlns:m="http://schemas.openxmlformats.org/officeDocument/2006/math" xmlns="" val="1"/>
             </a:ext>
           </a:extLst>
         </p:spPr>
@@ -3597,7 +3597,7 @@
           </a:ln>
           <a:extLst>
             <a:ext uri="{C572A759-6A51-4108-AA02-DFA0A04FC94B}">
-              <ma14:wrappingTextBoxFlag xmlns="" xmlns:m="http://schemas.openxmlformats.org/officeDocument/2006/math" xmlns:a14="http://schemas.microsoft.com/office/drawing/2010/main" xmlns:ma14="http://schemas.microsoft.com/office/mac/drawingml/2011/main" val="1"/>
+              <ma14:wrappingTextBoxFlag xmlns:ma14="http://schemas.microsoft.com/office/mac/drawingml/2011/main" xmlns:a14="http://schemas.microsoft.com/office/drawing/2010/main" xmlns:m="http://schemas.openxmlformats.org/officeDocument/2006/math" xmlns="" val="1"/>
             </a:ext>
           </a:extLst>
         </p:spPr>
@@ -3665,7 +3665,7 @@
           </a:ln>
           <a:extLst>
             <a:ext uri="{C572A759-6A51-4108-AA02-DFA0A04FC94B}">
-              <ma14:wrappingTextBoxFlag xmlns="" xmlns:m="http://schemas.openxmlformats.org/officeDocument/2006/math" xmlns:a14="http://schemas.microsoft.com/office/drawing/2010/main" xmlns:ma14="http://schemas.microsoft.com/office/mac/drawingml/2011/main" val="1"/>
+              <ma14:wrappingTextBoxFlag xmlns:ma14="http://schemas.microsoft.com/office/mac/drawingml/2011/main" xmlns:a14="http://schemas.microsoft.com/office/drawing/2010/main" xmlns:m="http://schemas.openxmlformats.org/officeDocument/2006/math" xmlns="" val="1"/>
             </a:ext>
           </a:extLst>
         </p:spPr>
@@ -4678,7 +4678,7 @@
           </a:ln>
           <a:extLst>
             <a:ext uri="{C572A759-6A51-4108-AA02-DFA0A04FC94B}">
-              <ma14:wrappingTextBoxFlag xmlns="" xmlns:m="http://schemas.openxmlformats.org/officeDocument/2006/math" xmlns:a14="http://schemas.microsoft.com/office/drawing/2010/main" xmlns:ma14="http://schemas.microsoft.com/office/mac/drawingml/2011/main" val="1"/>
+              <ma14:wrappingTextBoxFlag xmlns:ma14="http://schemas.microsoft.com/office/mac/drawingml/2011/main" xmlns:a14="http://schemas.microsoft.com/office/drawing/2010/main" xmlns:m="http://schemas.openxmlformats.org/officeDocument/2006/math" xmlns="" val="1"/>
             </a:ext>
           </a:extLst>
         </p:spPr>
@@ -4711,7 +4711,7 @@
                   <a:srgbClr val="628DB5"/>
                 </a:solidFill>
               </a:rPr>
-              <a:t>Specify sequential retries + provide fallback value if attempts failed</a:t>
+              <a:t>Specify sequential retries + provide a fallback if all attempts failed</a:t>
             </a:r>
             <a:endParaRPr sz="2000" b="0" dirty="0">
               <a:solidFill>
@@ -5454,7 +5454,7 @@
           </a:ln>
           <a:extLst>
             <a:ext uri="{C572A759-6A51-4108-AA02-DFA0A04FC94B}">
-              <ma14:wrappingTextBoxFlag xmlns="" xmlns:m="http://schemas.openxmlformats.org/officeDocument/2006/math" xmlns:a14="http://schemas.microsoft.com/office/drawing/2010/main" xmlns:ma14="http://schemas.microsoft.com/office/mac/drawingml/2011/main" val="1"/>
+              <ma14:wrappingTextBoxFlag xmlns:ma14="http://schemas.microsoft.com/office/mac/drawingml/2011/main" xmlns:a14="http://schemas.microsoft.com/office/drawing/2010/main" xmlns:m="http://schemas.openxmlformats.org/officeDocument/2006/math" xmlns="" val="1"/>
             </a:ext>
           </a:extLst>
         </p:spPr>
@@ -5487,7 +5487,7 @@
                   <a:srgbClr val="628DB5"/>
                 </a:solidFill>
               </a:rPr>
-              <a:t>Specify concurrent retries + wait until the fastest success response</a:t>
+              <a:t>Specify concurrent retries + wait until the first successful response</a:t>
             </a:r>
             <a:endParaRPr sz="2000" b="0" dirty="0">
               <a:solidFill>

</xml_diff>

<commit_message>
Last fix, fingers crossed
</commit_message>
<xml_diff>
--- a/docs/media/cheat-sheet-hedging.pptx
+++ b/docs/media/cheat-sheet-hedging.pptx
@@ -2124,7 +2124,7 @@
           </a:ln>
           <a:extLst>
             <a:ext uri="{C572A759-6A51-4108-AA02-DFA0A04FC94B}">
-              <ma14:wrappingTextBoxFlag xmlns:ma14="http://schemas.microsoft.com/office/mac/drawingml/2011/main" xmlns:a14="http://schemas.microsoft.com/office/drawing/2010/main" xmlns:m="http://schemas.openxmlformats.org/officeDocument/2006/math" xmlns="" val="1"/>
+              <ma14:wrappingTextBoxFlag xmlns="" xmlns:m="http://schemas.openxmlformats.org/officeDocument/2006/math" xmlns:a14="http://schemas.microsoft.com/office/drawing/2010/main" xmlns:ma14="http://schemas.microsoft.com/office/mac/drawingml/2011/main" val="1"/>
             </a:ext>
           </a:extLst>
         </p:spPr>
@@ -2163,7 +2163,7 @@
           </a:ln>
           <a:extLst>
             <a:ext uri="{C572A759-6A51-4108-AA02-DFA0A04FC94B}">
-              <ma14:wrappingTextBoxFlag xmlns:ma14="http://schemas.microsoft.com/office/mac/drawingml/2011/main" xmlns:a14="http://schemas.microsoft.com/office/drawing/2010/main" xmlns:m="http://schemas.openxmlformats.org/officeDocument/2006/math" xmlns="" val="1"/>
+              <ma14:wrappingTextBoxFlag xmlns="" xmlns:m="http://schemas.openxmlformats.org/officeDocument/2006/math" xmlns:a14="http://schemas.microsoft.com/office/drawing/2010/main" xmlns:ma14="http://schemas.microsoft.com/office/mac/drawingml/2011/main" val="1"/>
             </a:ext>
           </a:extLst>
         </p:spPr>
@@ -3363,7 +3363,14 @@
                 <a:latin typeface="Source Sans Pro" panose="020B0503030403020204" pitchFamily="34" charset="0"/>
                 <a:ea typeface="Source Sans Pro" panose="020B0503030403020204" pitchFamily="34" charset="0"/>
               </a:rPr>
-              <a:t>Delay less than 0 second </a:t>
+              <a:t>Delay less than </a:t>
+            </a:r>
+            <a:r>
+              <a:rPr lang="en-GB" sz="1600">
+                <a:latin typeface="Source Sans Pro" panose="020B0503030403020204" pitchFamily="34" charset="0"/>
+                <a:ea typeface="Source Sans Pro" panose="020B0503030403020204" pitchFamily="34" charset="0"/>
+              </a:rPr>
+              <a:t>0 seconds </a:t>
             </a:r>
             <a:r>
               <a:rPr lang="en-GB" sz="1600" b="0" dirty="0">
@@ -3451,7 +3458,7 @@
           </a:ln>
           <a:extLst>
             <a:ext uri="{C572A759-6A51-4108-AA02-DFA0A04FC94B}">
-              <ma14:wrappingTextBoxFlag xmlns:ma14="http://schemas.microsoft.com/office/mac/drawingml/2011/main" xmlns:a14="http://schemas.microsoft.com/office/drawing/2010/main" xmlns:m="http://schemas.openxmlformats.org/officeDocument/2006/math" xmlns="" val="1"/>
+              <ma14:wrappingTextBoxFlag xmlns="" xmlns:m="http://schemas.openxmlformats.org/officeDocument/2006/math" xmlns:a14="http://schemas.microsoft.com/office/drawing/2010/main" xmlns:ma14="http://schemas.microsoft.com/office/mac/drawingml/2011/main" val="1"/>
             </a:ext>
           </a:extLst>
         </p:spPr>
@@ -3552,7 +3559,7 @@
           </a:ln>
           <a:extLst>
             <a:ext uri="{C572A759-6A51-4108-AA02-DFA0A04FC94B}">
-              <ma14:wrappingTextBoxFlag xmlns:ma14="http://schemas.microsoft.com/office/mac/drawingml/2011/main" xmlns:a14="http://schemas.microsoft.com/office/drawing/2010/main" xmlns:m="http://schemas.openxmlformats.org/officeDocument/2006/math" xmlns="" val="1"/>
+              <ma14:wrappingTextBoxFlag xmlns="" xmlns:m="http://schemas.openxmlformats.org/officeDocument/2006/math" xmlns:a14="http://schemas.microsoft.com/office/drawing/2010/main" xmlns:ma14="http://schemas.microsoft.com/office/mac/drawingml/2011/main" val="1"/>
             </a:ext>
           </a:extLst>
         </p:spPr>
@@ -3597,7 +3604,7 @@
           </a:ln>
           <a:extLst>
             <a:ext uri="{C572A759-6A51-4108-AA02-DFA0A04FC94B}">
-              <ma14:wrappingTextBoxFlag xmlns:ma14="http://schemas.microsoft.com/office/mac/drawingml/2011/main" xmlns:a14="http://schemas.microsoft.com/office/drawing/2010/main" xmlns:m="http://schemas.openxmlformats.org/officeDocument/2006/math" xmlns="" val="1"/>
+              <ma14:wrappingTextBoxFlag xmlns="" xmlns:m="http://schemas.openxmlformats.org/officeDocument/2006/math" xmlns:a14="http://schemas.microsoft.com/office/drawing/2010/main" xmlns:ma14="http://schemas.microsoft.com/office/mac/drawingml/2011/main" val="1"/>
             </a:ext>
           </a:extLst>
         </p:spPr>
@@ -3665,7 +3672,7 @@
           </a:ln>
           <a:extLst>
             <a:ext uri="{C572A759-6A51-4108-AA02-DFA0A04FC94B}">
-              <ma14:wrappingTextBoxFlag xmlns:ma14="http://schemas.microsoft.com/office/mac/drawingml/2011/main" xmlns:a14="http://schemas.microsoft.com/office/drawing/2010/main" xmlns:m="http://schemas.openxmlformats.org/officeDocument/2006/math" xmlns="" val="1"/>
+              <ma14:wrappingTextBoxFlag xmlns="" xmlns:m="http://schemas.openxmlformats.org/officeDocument/2006/math" xmlns:a14="http://schemas.microsoft.com/office/drawing/2010/main" xmlns:ma14="http://schemas.microsoft.com/office/mac/drawingml/2011/main" val="1"/>
             </a:ext>
           </a:extLst>
         </p:spPr>
@@ -4678,7 +4685,7 @@
           </a:ln>
           <a:extLst>
             <a:ext uri="{C572A759-6A51-4108-AA02-DFA0A04FC94B}">
-              <ma14:wrappingTextBoxFlag xmlns:ma14="http://schemas.microsoft.com/office/mac/drawingml/2011/main" xmlns:a14="http://schemas.microsoft.com/office/drawing/2010/main" xmlns:m="http://schemas.openxmlformats.org/officeDocument/2006/math" xmlns="" val="1"/>
+              <ma14:wrappingTextBoxFlag xmlns="" xmlns:m="http://schemas.openxmlformats.org/officeDocument/2006/math" xmlns:a14="http://schemas.microsoft.com/office/drawing/2010/main" xmlns:ma14="http://schemas.microsoft.com/office/mac/drawingml/2011/main" val="1"/>
             </a:ext>
           </a:extLst>
         </p:spPr>
@@ -5454,7 +5461,7 @@
           </a:ln>
           <a:extLst>
             <a:ext uri="{C572A759-6A51-4108-AA02-DFA0A04FC94B}">
-              <ma14:wrappingTextBoxFlag xmlns:ma14="http://schemas.microsoft.com/office/mac/drawingml/2011/main" xmlns:a14="http://schemas.microsoft.com/office/drawing/2010/main" xmlns:m="http://schemas.openxmlformats.org/officeDocument/2006/math" xmlns="" val="1"/>
+              <ma14:wrappingTextBoxFlag xmlns="" xmlns:m="http://schemas.openxmlformats.org/officeDocument/2006/math" xmlns:a14="http://schemas.microsoft.com/office/drawing/2010/main" xmlns:ma14="http://schemas.microsoft.com/office/mac/drawingml/2011/main" val="1"/>
             </a:ext>
           </a:extLst>
         </p:spPr>

</xml_diff>